<commit_message>
Images added to the presentation
</commit_message>
<xml_diff>
--- a/Presentations/01/mdsd1.pptx
+++ b/Presentations/01/mdsd1.pptx
@@ -6,10 +6,10 @@
     <p:sldMasterId id="2147483655" r:id="rId2"/>
   </p:sldMasterIdLst>
   <p:notesMasterIdLst>
-    <p:notesMasterId r:id="rId13"/>
+    <p:notesMasterId r:id="rId16"/>
   </p:notesMasterIdLst>
   <p:handoutMasterIdLst>
-    <p:handoutMasterId r:id="rId14"/>
+    <p:handoutMasterId r:id="rId17"/>
   </p:handoutMasterIdLst>
   <p:sldIdLst>
     <p:sldId id="256" r:id="rId3"/>
@@ -20,8 +20,11 @@
     <p:sldId id="260" r:id="rId8"/>
     <p:sldId id="261" r:id="rId9"/>
     <p:sldId id="263" r:id="rId10"/>
-    <p:sldId id="264" r:id="rId11"/>
-    <p:sldId id="265" r:id="rId12"/>
+    <p:sldId id="266" r:id="rId11"/>
+    <p:sldId id="267" r:id="rId12"/>
+    <p:sldId id="268" r:id="rId13"/>
+    <p:sldId id="264" r:id="rId14"/>
+    <p:sldId id="265" r:id="rId15"/>
   </p:sldIdLst>
   <p:sldSz cx="9144000" cy="6858000" type="screen4x3"/>
   <p:notesSz cx="6858000" cy="9144000"/>
@@ -236,7 +239,7 @@
           <a:p>
             <a:fld id="{D320DF98-73A7-40A6-8A84-2EB5B4F2C4CC}" type="datetimeFigureOut">
               <a:rPr lang="hu-HU" smtClean="0"/>
-              <a:t>2016.03.21.</a:t>
+              <a:t>2016.03.24.</a:t>
             </a:fld>
             <a:endParaRPr lang="hu-HU"/>
           </a:p>
@@ -403,7 +406,7 @@
             <a:fld id="{B9130191-0BE1-0142-AFC1-0297AE024A0E}" type="datetimeFigureOut">
               <a:rPr lang="en-US" smtClean="0"/>
               <a:pPr/>
-              <a:t>3/21/2016</a:t>
+              <a:t>3/24/2016</a:t>
             </a:fld>
             <a:endParaRPr lang="en-US"/>
           </a:p>
@@ -736,140 +739,7 @@
               <a:tabLst/>
               <a:defRPr/>
             </a:pPr>
-            <a:r>
-              <a:rPr lang="hu-HU" dirty="0" smtClean="0"/>
-              <a:t>Jó</a:t>
-            </a:r>
-            <a:r>
-              <a:rPr lang="hu-HU" baseline="0" dirty="0" smtClean="0"/>
-              <a:t> napot kívánok, üdvözlök mindenkit! </a:t>
-            </a:r>
-          </a:p>
-          <a:p>
-            <a:pPr marL="171450" marR="0" indent="-171450" algn="l" defTabSz="914400" rtl="0" eaLnBrk="1" fontAlgn="auto" latinLnBrk="0" hangingPunct="1">
-              <a:lnSpc>
-                <a:spcPct val="100000"/>
-              </a:lnSpc>
-              <a:spcBef>
-                <a:spcPts val="0"/>
-              </a:spcBef>
-              <a:spcAft>
-                <a:spcPts val="0"/>
-              </a:spcAft>
-              <a:buClrTx/>
-              <a:buSzTx/>
-              <a:buFont typeface="Arial" panose="020B0604020202020204" pitchFamily="34" charset="0"/>
-              <a:buChar char="•"/>
-              <a:tabLst/>
-              <a:defRPr/>
-            </a:pPr>
             <a:endParaRPr lang="hu-HU" baseline="0" dirty="0" smtClean="0"/>
-          </a:p>
-          <a:p>
-            <a:pPr marL="171450" marR="0" indent="-171450" algn="l" defTabSz="914400" rtl="0" eaLnBrk="1" fontAlgn="auto" latinLnBrk="0" hangingPunct="1">
-              <a:lnSpc>
-                <a:spcPct val="100000"/>
-              </a:lnSpc>
-              <a:spcBef>
-                <a:spcPts val="0"/>
-              </a:spcBef>
-              <a:spcAft>
-                <a:spcPts val="0"/>
-              </a:spcAft>
-              <a:buClrTx/>
-              <a:buSzTx/>
-              <a:buFont typeface="Arial" panose="020B0604020202020204" pitchFamily="34" charset="0"/>
-              <a:buChar char="•"/>
-              <a:tabLst/>
-              <a:defRPr/>
-            </a:pPr>
-            <a:r>
-              <a:rPr lang="hu-HU" baseline="0" dirty="0" smtClean="0"/>
-              <a:t>A nevem </a:t>
-            </a:r>
-            <a:r>
-              <a:rPr lang="hu-HU" dirty="0" smtClean="0"/>
-              <a:t>Balogh László és </a:t>
-            </a:r>
-            <a:r>
-              <a:rPr lang="hu-HU" baseline="0" dirty="0" smtClean="0"/>
-              <a:t>az elkövetkezendő percekben a </a:t>
-            </a:r>
-            <a:r>
-              <a:rPr lang="hu-HU" dirty="0" smtClean="0"/>
-              <a:t>Kritikus kiberfizikai rendszerekben</a:t>
-            </a:r>
-            <a:r>
-              <a:rPr lang="hu-HU" baseline="0" dirty="0" smtClean="0"/>
-              <a:t> történő h</a:t>
-            </a:r>
-            <a:r>
-              <a:rPr lang="hu-HU" dirty="0" smtClean="0"/>
-              <a:t>ierarchikus futásidejű ellenőrzésről </a:t>
-            </a:r>
-            <a:r>
-              <a:rPr lang="hu-HU" baseline="0" dirty="0" smtClean="0"/>
-              <a:t>és az ezzel kapcsolatos elért eredményeikről fogunk Önöknek beszélni</a:t>
-            </a:r>
-          </a:p>
-          <a:p>
-            <a:pPr marL="171450" marR="0" indent="-171450" algn="l" defTabSz="914400" rtl="0" eaLnBrk="1" fontAlgn="auto" latinLnBrk="0" hangingPunct="1">
-              <a:lnSpc>
-                <a:spcPct val="100000"/>
-              </a:lnSpc>
-              <a:spcBef>
-                <a:spcPts val="0"/>
-              </a:spcBef>
-              <a:spcAft>
-                <a:spcPts val="0"/>
-              </a:spcAft>
-              <a:buClrTx/>
-              <a:buSzTx/>
-              <a:buFont typeface="Arial" panose="020B0604020202020204" pitchFamily="34" charset="0"/>
-              <a:buChar char="•"/>
-              <a:tabLst/>
-              <a:defRPr/>
-            </a:pPr>
-            <a:endParaRPr lang="hu-HU" baseline="0" dirty="0" smtClean="0"/>
-          </a:p>
-          <a:p>
-            <a:pPr marL="171450" marR="0" indent="-171450" algn="l" defTabSz="914400" rtl="0" eaLnBrk="1" fontAlgn="auto" latinLnBrk="0" hangingPunct="1">
-              <a:lnSpc>
-                <a:spcPct val="100000"/>
-              </a:lnSpc>
-              <a:spcBef>
-                <a:spcPts val="0"/>
-              </a:spcBef>
-              <a:spcAft>
-                <a:spcPts val="0"/>
-              </a:spcAft>
-              <a:buClrTx/>
-              <a:buSzTx/>
-              <a:buFont typeface="Arial" panose="020B0604020202020204" pitchFamily="34" charset="0"/>
-              <a:buChar char="•"/>
-              <a:tabLst/>
-              <a:defRPr/>
-            </a:pPr>
-            <a:r>
-              <a:rPr lang="hu-HU" baseline="0" dirty="0" smtClean="0"/>
-              <a:t>A TDK dolgozat másik két szerzője </a:t>
-            </a:r>
-            <a:r>
-              <a:rPr lang="hu-HU" baseline="0" dirty="0" err="1" smtClean="0"/>
-              <a:t>Deé</a:t>
-            </a:r>
-            <a:r>
-              <a:rPr lang="hu-HU" baseline="0" dirty="0" smtClean="0"/>
-              <a:t> Flórián, és Hegyi Bálint, a konzulenseink Dr. Varró Dániel, Dr. Ráth István, és Vörös András</a:t>
-            </a:r>
-            <a:r>
-              <a:rPr lang="hu-HU" baseline="0" dirty="0"/>
-              <a:t> </a:t>
-            </a:r>
-            <a:r>
-              <a:rPr lang="hu-HU" baseline="0" dirty="0" smtClean="0"/>
-              <a:t>voltak</a:t>
-            </a:r>
           </a:p>
         </p:txBody>
       </p:sp>
@@ -937,6 +807,189 @@
     </p:spTree>
     <p:extLst>
       <p:ext uri="{BB962C8B-B14F-4D97-AF65-F5344CB8AC3E}">
+        <p14:creationId xmlns:p14="http://schemas.microsoft.com/office/powerpoint/2010/main" val="2625778076"/>
+      </p:ext>
+    </p:extLst>
+  </p:cSld>
+  <p:clrMapOvr>
+    <a:masterClrMapping/>
+  </p:clrMapOvr>
+</p:notes>
+</file>
+
+<file path=ppt/notesSlides/notesSlide11.xml><?xml version="1.0" encoding="utf-8"?>
+<p:notes xmlns:a="http://schemas.openxmlformats.org/drawingml/2006/main" xmlns:r="http://schemas.openxmlformats.org/officeDocument/2006/relationships" xmlns:p="http://schemas.openxmlformats.org/presentationml/2006/main">
+  <p:cSld>
+    <p:spTree>
+      <p:nvGrpSpPr>
+        <p:cNvPr id="1" name=""/>
+        <p:cNvGrpSpPr/>
+        <p:nvPr/>
+      </p:nvGrpSpPr>
+      <p:grpSpPr>
+        <a:xfrm>
+          <a:off x="0" y="0"/>
+          <a:ext cx="0" cy="0"/>
+          <a:chOff x="0" y="0"/>
+          <a:chExt cx="0" cy="0"/>
+        </a:xfrm>
+      </p:grpSpPr>
+      <p:sp>
+        <p:nvSpPr>
+          <p:cNvPr id="2" name="Slide Image Placeholder 1"/>
+          <p:cNvSpPr>
+            <a:spLocks noGrp="1" noRot="1" noChangeAspect="1"/>
+          </p:cNvSpPr>
+          <p:nvPr>
+            <p:ph type="sldImg"/>
+          </p:nvPr>
+        </p:nvSpPr>
+        <p:spPr/>
+      </p:sp>
+      <p:sp>
+        <p:nvSpPr>
+          <p:cNvPr id="3" name="Notes Placeholder 2"/>
+          <p:cNvSpPr>
+            <a:spLocks noGrp="1"/>
+          </p:cNvSpPr>
+          <p:nvPr>
+            <p:ph type="body" idx="1"/>
+          </p:nvPr>
+        </p:nvSpPr>
+        <p:spPr/>
+        <p:txBody>
+          <a:bodyPr/>
+          <a:lstStyle/>
+          <a:p>
+            <a:endParaRPr lang="en-US" dirty="0"/>
+          </a:p>
+        </p:txBody>
+      </p:sp>
+    </p:spTree>
+    <p:extLst>
+      <p:ext uri="{BB962C8B-B14F-4D97-AF65-F5344CB8AC3E}">
+        <p14:creationId xmlns:p14="http://schemas.microsoft.com/office/powerpoint/2010/main" val="1924008163"/>
+      </p:ext>
+    </p:extLst>
+  </p:cSld>
+  <p:clrMapOvr>
+    <a:masterClrMapping/>
+  </p:clrMapOvr>
+</p:notes>
+</file>
+
+<file path=ppt/notesSlides/notesSlide12.xml><?xml version="1.0" encoding="utf-8"?>
+<p:notes xmlns:a="http://schemas.openxmlformats.org/drawingml/2006/main" xmlns:r="http://schemas.openxmlformats.org/officeDocument/2006/relationships" xmlns:p="http://schemas.openxmlformats.org/presentationml/2006/main">
+  <p:cSld>
+    <p:spTree>
+      <p:nvGrpSpPr>
+        <p:cNvPr id="1" name=""/>
+        <p:cNvGrpSpPr/>
+        <p:nvPr/>
+      </p:nvGrpSpPr>
+      <p:grpSpPr>
+        <a:xfrm>
+          <a:off x="0" y="0"/>
+          <a:ext cx="0" cy="0"/>
+          <a:chOff x="0" y="0"/>
+          <a:chExt cx="0" cy="0"/>
+        </a:xfrm>
+      </p:grpSpPr>
+      <p:sp>
+        <p:nvSpPr>
+          <p:cNvPr id="2" name="Slide Image Placeholder 1"/>
+          <p:cNvSpPr>
+            <a:spLocks noGrp="1" noRot="1" noChangeAspect="1"/>
+          </p:cNvSpPr>
+          <p:nvPr>
+            <p:ph type="sldImg"/>
+          </p:nvPr>
+        </p:nvSpPr>
+        <p:spPr/>
+      </p:sp>
+      <p:sp>
+        <p:nvSpPr>
+          <p:cNvPr id="3" name="Notes Placeholder 2"/>
+          <p:cNvSpPr>
+            <a:spLocks noGrp="1"/>
+          </p:cNvSpPr>
+          <p:nvPr>
+            <p:ph type="body" idx="1"/>
+          </p:nvPr>
+        </p:nvSpPr>
+        <p:spPr/>
+        <p:txBody>
+          <a:bodyPr/>
+          <a:lstStyle/>
+          <a:p>
+            <a:endParaRPr lang="en-US" dirty="0"/>
+          </a:p>
+        </p:txBody>
+      </p:sp>
+    </p:spTree>
+    <p:extLst>
+      <p:ext uri="{BB962C8B-B14F-4D97-AF65-F5344CB8AC3E}">
+        <p14:creationId xmlns:p14="http://schemas.microsoft.com/office/powerpoint/2010/main" val="3187488961"/>
+      </p:ext>
+    </p:extLst>
+  </p:cSld>
+  <p:clrMapOvr>
+    <a:masterClrMapping/>
+  </p:clrMapOvr>
+</p:notes>
+</file>
+
+<file path=ppt/notesSlides/notesSlide13.xml><?xml version="1.0" encoding="utf-8"?>
+<p:notes xmlns:a="http://schemas.openxmlformats.org/drawingml/2006/main" xmlns:r="http://schemas.openxmlformats.org/officeDocument/2006/relationships" xmlns:p="http://schemas.openxmlformats.org/presentationml/2006/main">
+  <p:cSld>
+    <p:spTree>
+      <p:nvGrpSpPr>
+        <p:cNvPr id="1" name=""/>
+        <p:cNvGrpSpPr/>
+        <p:nvPr/>
+      </p:nvGrpSpPr>
+      <p:grpSpPr>
+        <a:xfrm>
+          <a:off x="0" y="0"/>
+          <a:ext cx="0" cy="0"/>
+          <a:chOff x="0" y="0"/>
+          <a:chExt cx="0" cy="0"/>
+        </a:xfrm>
+      </p:grpSpPr>
+      <p:sp>
+        <p:nvSpPr>
+          <p:cNvPr id="2" name="Slide Image Placeholder 1"/>
+          <p:cNvSpPr>
+            <a:spLocks noGrp="1" noRot="1" noChangeAspect="1"/>
+          </p:cNvSpPr>
+          <p:nvPr>
+            <p:ph type="sldImg"/>
+          </p:nvPr>
+        </p:nvSpPr>
+        <p:spPr/>
+      </p:sp>
+      <p:sp>
+        <p:nvSpPr>
+          <p:cNvPr id="3" name="Notes Placeholder 2"/>
+          <p:cNvSpPr>
+            <a:spLocks noGrp="1"/>
+          </p:cNvSpPr>
+          <p:nvPr>
+            <p:ph type="body" idx="1"/>
+          </p:nvPr>
+        </p:nvSpPr>
+        <p:spPr/>
+        <p:txBody>
+          <a:bodyPr/>
+          <a:lstStyle/>
+          <a:p>
+            <a:endParaRPr lang="en-US" dirty="0"/>
+          </a:p>
+        </p:txBody>
+      </p:sp>
+    </p:spTree>
+    <p:extLst>
+      <p:ext uri="{BB962C8B-B14F-4D97-AF65-F5344CB8AC3E}">
         <p14:creationId xmlns:p14="http://schemas.microsoft.com/office/powerpoint/2010/main" val="2414867705"/>
       </p:ext>
     </p:extLst>
@@ -1425,7 +1478,7 @@
     </p:spTree>
     <p:extLst>
       <p:ext uri="{BB962C8B-B14F-4D97-AF65-F5344CB8AC3E}">
-        <p14:creationId xmlns:p14="http://schemas.microsoft.com/office/powerpoint/2010/main" val="3187488961"/>
+        <p14:creationId xmlns:p14="http://schemas.microsoft.com/office/powerpoint/2010/main" val="1381603377"/>
       </p:ext>
     </p:extLst>
   </p:cSld>
@@ -5950,7 +6003,7 @@
           <a:p>
             <a:r>
               <a:rPr lang="hu-HU" dirty="0" smtClean="0"/>
-              <a:t>Hierarchikus futásidejű ellenőrzés kritikus kiberfizikai rendszerekhez</a:t>
+              <a:t>MDSD Házi feladat – 1. beadás</a:t>
             </a:r>
             <a:endParaRPr lang="en-US" dirty="0"/>
           </a:p>
@@ -5983,31 +6036,11 @@
           <a:p>
             <a:r>
               <a:rPr lang="hu-HU" sz="2800" b="1" dirty="0" smtClean="0"/>
-              <a:t>Balogh </a:t>
-            </a:r>
-            <a:r>
-              <a:rPr lang="hu-HU" sz="2800" b="1" dirty="0" smtClean="0"/>
-              <a:t>László</a:t>
-            </a:r>
-            <a:r>
-              <a:rPr lang="hu-HU" sz="2800" b="1" dirty="0" smtClean="0"/>
-              <a:t>, </a:t>
-            </a:r>
-            <a:r>
-              <a:rPr lang="hu-HU" sz="2800" b="1" dirty="0" smtClean="0"/>
-              <a:t>Hegyi </a:t>
+              <a:t>Balogh László, Hegyi </a:t>
             </a:r>
             <a:r>
               <a:rPr lang="hu-HU" sz="2800" b="1" dirty="0"/>
-              <a:t>Bálint, </a:t>
-            </a:r>
-            <a:r>
-              <a:rPr lang="hu-HU" sz="2800" b="1" dirty="0" err="1"/>
-              <a:t>Marussy</a:t>
-            </a:r>
-            <a:r>
-              <a:rPr lang="hu-HU" sz="2800" b="1" dirty="0"/>
-              <a:t> Kristóf</a:t>
+              <a:t>Bálint, Marussy Kristóf</a:t>
             </a:r>
             <a:endParaRPr lang="hu-HU" sz="2800" b="1" dirty="0" smtClean="0"/>
           </a:p>
@@ -6072,11 +6105,348 @@
           <a:p>
             <a:r>
               <a:rPr lang="hu-HU" dirty="0" smtClean="0"/>
-              <a:t>Példány</a:t>
+              <a:t>Viselkedési </a:t>
+            </a:r>
+            <a:r>
+              <a:rPr lang="hu-HU" dirty="0" err="1" smtClean="0"/>
+              <a:t>metamodell</a:t>
             </a:r>
             <a:r>
               <a:rPr lang="hu-HU" dirty="0" smtClean="0"/>
-              <a:t>modell – TBD</a:t>
+              <a:t> – </a:t>
+            </a:r>
+            <a:r>
+              <a:rPr lang="hu-HU" dirty="0" err="1" smtClean="0"/>
+              <a:t>Statement</a:t>
+            </a:r>
+            <a:endParaRPr lang="en-US" dirty="0"/>
+          </a:p>
+        </p:txBody>
+      </p:sp>
+      <p:sp>
+        <p:nvSpPr>
+          <p:cNvPr id="3" name="Tartalom helye 2"/>
+          <p:cNvSpPr>
+            <a:spLocks noGrp="1"/>
+          </p:cNvSpPr>
+          <p:nvPr>
+            <p:ph idx="1"/>
+          </p:nvPr>
+        </p:nvSpPr>
+        <p:spPr/>
+        <p:txBody>
+          <a:bodyPr/>
+          <a:lstStyle/>
+          <a:p>
+            <a:pPr marL="0" indent="0">
+              <a:buNone/>
+            </a:pPr>
+            <a:endParaRPr lang="en-US" dirty="0"/>
+          </a:p>
+        </p:txBody>
+      </p:sp>
+      <p:pic>
+        <p:nvPicPr>
+          <p:cNvPr id="4" name="Kép 3"/>
+          <p:cNvPicPr>
+            <a:picLocks noChangeAspect="1"/>
+          </p:cNvPicPr>
+          <p:nvPr/>
+        </p:nvPicPr>
+        <p:blipFill>
+          <a:blip r:embed="rId3"/>
+          <a:stretch>
+            <a:fillRect/>
+          </a:stretch>
+        </p:blipFill>
+        <p:spPr>
+          <a:xfrm>
+            <a:off x="7824" y="1337939"/>
+            <a:ext cx="9128351" cy="4567883"/>
+          </a:xfrm>
+          <a:prstGeom prst="rect">
+            <a:avLst/>
+          </a:prstGeom>
+        </p:spPr>
+      </p:pic>
+    </p:spTree>
+    <p:extLst>
+      <p:ext uri="{BB962C8B-B14F-4D97-AF65-F5344CB8AC3E}">
+        <p14:creationId xmlns:p14="http://schemas.microsoft.com/office/powerpoint/2010/main" val="279551554"/>
+      </p:ext>
+    </p:extLst>
+  </p:cSld>
+  <p:clrMapOvr>
+    <a:masterClrMapping/>
+  </p:clrMapOvr>
+  <p:timing>
+    <p:tnLst>
+      <p:par>
+        <p:cTn id="1" dur="indefinite" restart="never" nodeType="tmRoot"/>
+      </p:par>
+    </p:tnLst>
+  </p:timing>
+</p:sld>
+</file>
+
+<file path=ppt/slides/slide11.xml><?xml version="1.0" encoding="utf-8"?>
+<p:sld xmlns:a="http://schemas.openxmlformats.org/drawingml/2006/main" xmlns:r="http://schemas.openxmlformats.org/officeDocument/2006/relationships" xmlns:p="http://schemas.openxmlformats.org/presentationml/2006/main">
+  <p:cSld>
+    <p:spTree>
+      <p:nvGrpSpPr>
+        <p:cNvPr id="1" name=""/>
+        <p:cNvGrpSpPr/>
+        <p:nvPr/>
+      </p:nvGrpSpPr>
+      <p:grpSpPr>
+        <a:xfrm>
+          <a:off x="0" y="0"/>
+          <a:ext cx="0" cy="0"/>
+          <a:chOff x="0" y="0"/>
+          <a:chExt cx="0" cy="0"/>
+        </a:xfrm>
+      </p:grpSpPr>
+      <p:sp>
+        <p:nvSpPr>
+          <p:cNvPr id="2" name="Cím 1"/>
+          <p:cNvSpPr>
+            <a:spLocks noGrp="1"/>
+          </p:cNvSpPr>
+          <p:nvPr>
+            <p:ph type="title"/>
+          </p:nvPr>
+        </p:nvSpPr>
+        <p:spPr>
+          <a:xfrm>
+            <a:off x="0" y="0"/>
+            <a:ext cx="9144000" cy="720725"/>
+          </a:xfrm>
+        </p:spPr>
+        <p:txBody>
+          <a:bodyPr/>
+          <a:lstStyle/>
+          <a:p>
+            <a:r>
+              <a:rPr lang="hu-HU" dirty="0" smtClean="0"/>
+              <a:t>Viselkedési </a:t>
+            </a:r>
+            <a:r>
+              <a:rPr lang="hu-HU" dirty="0" err="1" smtClean="0"/>
+              <a:t>metamodell</a:t>
+            </a:r>
+            <a:r>
+              <a:rPr lang="hu-HU" dirty="0" smtClean="0"/>
+              <a:t> – </a:t>
+            </a:r>
+            <a:r>
+              <a:rPr lang="hu-HU" dirty="0" smtClean="0"/>
+              <a:t>Egyedi esetek</a:t>
+            </a:r>
+            <a:endParaRPr lang="en-US" dirty="0"/>
+          </a:p>
+        </p:txBody>
+      </p:sp>
+      <p:sp>
+        <p:nvSpPr>
+          <p:cNvPr id="3" name="Tartalom helye 2"/>
+          <p:cNvSpPr>
+            <a:spLocks noGrp="1"/>
+          </p:cNvSpPr>
+          <p:nvPr>
+            <p:ph idx="1"/>
+          </p:nvPr>
+        </p:nvSpPr>
+        <p:spPr/>
+        <p:txBody>
+          <a:bodyPr/>
+          <a:lstStyle/>
+          <a:p>
+            <a:pPr marL="0" indent="0">
+              <a:buNone/>
+            </a:pPr>
+            <a:endParaRPr lang="en-US" dirty="0"/>
+          </a:p>
+        </p:txBody>
+      </p:sp>
+      <p:pic>
+        <p:nvPicPr>
+          <p:cNvPr id="5" name="Kép 4"/>
+          <p:cNvPicPr>
+            <a:picLocks noChangeAspect="1"/>
+          </p:cNvPicPr>
+          <p:nvPr/>
+        </p:nvPicPr>
+        <p:blipFill>
+          <a:blip r:embed="rId3"/>
+          <a:stretch>
+            <a:fillRect/>
+          </a:stretch>
+        </p:blipFill>
+        <p:spPr>
+          <a:xfrm>
+            <a:off x="602430" y="1126846"/>
+            <a:ext cx="7939140" cy="4990069"/>
+          </a:xfrm>
+          <a:prstGeom prst="rect">
+            <a:avLst/>
+          </a:prstGeom>
+        </p:spPr>
+      </p:pic>
+    </p:spTree>
+    <p:extLst>
+      <p:ext uri="{BB962C8B-B14F-4D97-AF65-F5344CB8AC3E}">
+        <p14:creationId xmlns:p14="http://schemas.microsoft.com/office/powerpoint/2010/main" val="191882004"/>
+      </p:ext>
+    </p:extLst>
+  </p:cSld>
+  <p:clrMapOvr>
+    <a:masterClrMapping/>
+  </p:clrMapOvr>
+  <p:timing>
+    <p:tnLst>
+      <p:par>
+        <p:cTn id="1" dur="indefinite" restart="never" nodeType="tmRoot"/>
+      </p:par>
+    </p:tnLst>
+  </p:timing>
+</p:sld>
+</file>
+
+<file path=ppt/slides/slide12.xml><?xml version="1.0" encoding="utf-8"?>
+<p:sld xmlns:a="http://schemas.openxmlformats.org/drawingml/2006/main" xmlns:r="http://schemas.openxmlformats.org/officeDocument/2006/relationships" xmlns:p="http://schemas.openxmlformats.org/presentationml/2006/main">
+  <p:cSld>
+    <p:spTree>
+      <p:nvGrpSpPr>
+        <p:cNvPr id="1" name=""/>
+        <p:cNvGrpSpPr/>
+        <p:nvPr/>
+      </p:nvGrpSpPr>
+      <p:grpSpPr>
+        <a:xfrm>
+          <a:off x="0" y="0"/>
+          <a:ext cx="0" cy="0"/>
+          <a:chOff x="0" y="0"/>
+          <a:chExt cx="0" cy="0"/>
+        </a:xfrm>
+      </p:grpSpPr>
+      <p:sp>
+        <p:nvSpPr>
+          <p:cNvPr id="2" name="Cím 1"/>
+          <p:cNvSpPr>
+            <a:spLocks noGrp="1"/>
+          </p:cNvSpPr>
+          <p:nvPr>
+            <p:ph type="title"/>
+          </p:nvPr>
+        </p:nvSpPr>
+        <p:spPr>
+          <a:xfrm>
+            <a:off x="0" y="0"/>
+            <a:ext cx="9144000" cy="720725"/>
+          </a:xfrm>
+        </p:spPr>
+        <p:txBody>
+          <a:bodyPr/>
+          <a:lstStyle/>
+          <a:p>
+            <a:r>
+              <a:rPr lang="hu-HU" dirty="0" smtClean="0"/>
+              <a:t>Szimulációs </a:t>
+            </a:r>
+            <a:r>
+              <a:rPr lang="hu-HU" dirty="0" err="1" smtClean="0"/>
+              <a:t>metamodell</a:t>
+            </a:r>
+            <a:endParaRPr lang="en-US" dirty="0"/>
+          </a:p>
+        </p:txBody>
+      </p:sp>
+      <p:pic>
+        <p:nvPicPr>
+          <p:cNvPr id="4" name="Tartalom helye 3"/>
+          <p:cNvPicPr>
+            <a:picLocks noGrp="1" noChangeAspect="1"/>
+          </p:cNvPicPr>
+          <p:nvPr>
+            <p:ph idx="1"/>
+          </p:nvPr>
+        </p:nvPicPr>
+        <p:blipFill>
+          <a:blip r:embed="rId3"/>
+          <a:stretch>
+            <a:fillRect/>
+          </a:stretch>
+        </p:blipFill>
+        <p:spPr>
+          <a:xfrm>
+            <a:off x="378553" y="857250"/>
+            <a:ext cx="8386894" cy="5529263"/>
+          </a:xfrm>
+          <a:prstGeom prst="rect">
+            <a:avLst/>
+          </a:prstGeom>
+        </p:spPr>
+      </p:pic>
+    </p:spTree>
+    <p:extLst>
+      <p:ext uri="{BB962C8B-B14F-4D97-AF65-F5344CB8AC3E}">
+        <p14:creationId xmlns:p14="http://schemas.microsoft.com/office/powerpoint/2010/main" val="3538134762"/>
+      </p:ext>
+    </p:extLst>
+  </p:cSld>
+  <p:clrMapOvr>
+    <a:masterClrMapping/>
+  </p:clrMapOvr>
+  <p:timing>
+    <p:tnLst>
+      <p:par>
+        <p:cTn id="1" dur="indefinite" restart="never" nodeType="tmRoot"/>
+      </p:par>
+    </p:tnLst>
+  </p:timing>
+</p:sld>
+</file>
+
+<file path=ppt/slides/slide13.xml><?xml version="1.0" encoding="utf-8"?>
+<p:sld xmlns:a="http://schemas.openxmlformats.org/drawingml/2006/main" xmlns:r="http://schemas.openxmlformats.org/officeDocument/2006/relationships" xmlns:p="http://schemas.openxmlformats.org/presentationml/2006/main">
+  <p:cSld>
+    <p:spTree>
+      <p:nvGrpSpPr>
+        <p:cNvPr id="1" name=""/>
+        <p:cNvGrpSpPr/>
+        <p:nvPr/>
+      </p:nvGrpSpPr>
+      <p:grpSpPr>
+        <a:xfrm>
+          <a:off x="0" y="0"/>
+          <a:ext cx="0" cy="0"/>
+          <a:chOff x="0" y="0"/>
+          <a:chExt cx="0" cy="0"/>
+        </a:xfrm>
+      </p:grpSpPr>
+      <p:sp>
+        <p:nvSpPr>
+          <p:cNvPr id="2" name="Cím 1"/>
+          <p:cNvSpPr>
+            <a:spLocks noGrp="1"/>
+          </p:cNvSpPr>
+          <p:nvPr>
+            <p:ph type="title"/>
+          </p:nvPr>
+        </p:nvSpPr>
+        <p:spPr>
+          <a:xfrm>
+            <a:off x="0" y="0"/>
+            <a:ext cx="9144000" cy="720725"/>
+          </a:xfrm>
+        </p:spPr>
+        <p:txBody>
+          <a:bodyPr/>
+          <a:lstStyle/>
+          <a:p>
+            <a:r>
+              <a:rPr lang="hu-HU" dirty="0" smtClean="0"/>
+              <a:t>Példánymodell – TBD</a:t>
             </a:r>
             <a:endParaRPr lang="en-US" dirty="0"/>
           </a:p>
@@ -7002,7 +7372,7 @@
           <a:p>
             <a:r>
               <a:rPr lang="hu-HU" dirty="0" smtClean="0"/>
-              <a:t>Futásidejű </a:t>
+              <a:t>Viselkedési </a:t>
             </a:r>
             <a:r>
               <a:rPr lang="hu-HU" dirty="0" err="1" smtClean="0"/>
@@ -7010,7 +7380,15 @@
             </a:r>
             <a:r>
               <a:rPr lang="hu-HU" dirty="0" smtClean="0"/>
-              <a:t> – TBD</a:t>
+              <a:t> – </a:t>
+            </a:r>
+            <a:r>
+              <a:rPr lang="hu-HU" dirty="0" smtClean="0"/>
+              <a:t>Top </a:t>
+            </a:r>
+            <a:r>
+              <a:rPr lang="hu-HU" dirty="0" err="1" smtClean="0"/>
+              <a:t>level</a:t>
             </a:r>
             <a:endParaRPr lang="en-US" dirty="0"/>
           </a:p>
@@ -7031,18 +7409,41 @@
           <a:bodyPr/>
           <a:lstStyle/>
           <a:p>
-            <a:r>
-              <a:rPr lang="hu-HU" dirty="0" smtClean="0"/>
-              <a:t>TBD</a:t>
-            </a:r>
+            <a:pPr marL="0" indent="0">
+              <a:buNone/>
+            </a:pPr>
             <a:endParaRPr lang="en-US" dirty="0"/>
           </a:p>
         </p:txBody>
       </p:sp>
+      <p:pic>
+        <p:nvPicPr>
+          <p:cNvPr id="5" name="Kép 4"/>
+          <p:cNvPicPr>
+            <a:picLocks noChangeAspect="1"/>
+          </p:cNvPicPr>
+          <p:nvPr/>
+        </p:nvPicPr>
+        <p:blipFill>
+          <a:blip r:embed="rId3"/>
+          <a:stretch>
+            <a:fillRect/>
+          </a:stretch>
+        </p:blipFill>
+        <p:spPr>
+          <a:xfrm>
+            <a:off x="1842694" y="1106638"/>
+            <a:ext cx="5458611" cy="5030485"/>
+          </a:xfrm>
+          <a:prstGeom prst="rect">
+            <a:avLst/>
+          </a:prstGeom>
+        </p:spPr>
+      </p:pic>
     </p:spTree>
     <p:extLst>
       <p:ext uri="{BB962C8B-B14F-4D97-AF65-F5344CB8AC3E}">
-        <p14:creationId xmlns:p14="http://schemas.microsoft.com/office/powerpoint/2010/main" val="3538134762"/>
+        <p14:creationId xmlns:p14="http://schemas.microsoft.com/office/powerpoint/2010/main" val="2177205649"/>
       </p:ext>
     </p:extLst>
   </p:cSld>

</xml_diff>

<commit_message>
More images and patterns added to the first presentation
</commit_message>
<xml_diff>
--- a/Presentations/01/mdsd1.pptx
+++ b/Presentations/01/mdsd1.pptx
@@ -6,10 +6,10 @@
     <p:sldMasterId id="2147483655" r:id="rId2"/>
   </p:sldMasterIdLst>
   <p:notesMasterIdLst>
-    <p:notesMasterId r:id="rId16"/>
+    <p:notesMasterId r:id="rId18"/>
   </p:notesMasterIdLst>
   <p:handoutMasterIdLst>
-    <p:handoutMasterId r:id="rId17"/>
+    <p:handoutMasterId r:id="rId19"/>
   </p:handoutMasterIdLst>
   <p:sldIdLst>
     <p:sldId id="256" r:id="rId3"/>
@@ -19,12 +19,14 @@
     <p:sldId id="259" r:id="rId7"/>
     <p:sldId id="260" r:id="rId8"/>
     <p:sldId id="261" r:id="rId9"/>
-    <p:sldId id="263" r:id="rId10"/>
+    <p:sldId id="272" r:id="rId10"/>
     <p:sldId id="266" r:id="rId11"/>
     <p:sldId id="267" r:id="rId12"/>
     <p:sldId id="268" r:id="rId13"/>
     <p:sldId id="264" r:id="rId14"/>
-    <p:sldId id="265" r:id="rId15"/>
+    <p:sldId id="271" r:id="rId15"/>
+    <p:sldId id="265" r:id="rId16"/>
+    <p:sldId id="269" r:id="rId17"/>
   </p:sldIdLst>
   <p:sldSz cx="9144000" cy="6858000" type="screen4x3"/>
   <p:notesSz cx="6858000" cy="9144000"/>
@@ -990,7 +992,129 @@
     </p:spTree>
     <p:extLst>
       <p:ext uri="{BB962C8B-B14F-4D97-AF65-F5344CB8AC3E}">
+        <p14:creationId xmlns:p14="http://schemas.microsoft.com/office/powerpoint/2010/main" val="1598788037"/>
+      </p:ext>
+    </p:extLst>
+  </p:cSld>
+  <p:clrMapOvr>
+    <a:masterClrMapping/>
+  </p:clrMapOvr>
+</p:notes>
+</file>
+
+<file path=ppt/notesSlides/notesSlide14.xml><?xml version="1.0" encoding="utf-8"?>
+<p:notes xmlns:a="http://schemas.openxmlformats.org/drawingml/2006/main" xmlns:r="http://schemas.openxmlformats.org/officeDocument/2006/relationships" xmlns:p="http://schemas.openxmlformats.org/presentationml/2006/main">
+  <p:cSld>
+    <p:spTree>
+      <p:nvGrpSpPr>
+        <p:cNvPr id="1" name=""/>
+        <p:cNvGrpSpPr/>
+        <p:nvPr/>
+      </p:nvGrpSpPr>
+      <p:grpSpPr>
+        <a:xfrm>
+          <a:off x="0" y="0"/>
+          <a:ext cx="0" cy="0"/>
+          <a:chOff x="0" y="0"/>
+          <a:chExt cx="0" cy="0"/>
+        </a:xfrm>
+      </p:grpSpPr>
+      <p:sp>
+        <p:nvSpPr>
+          <p:cNvPr id="2" name="Slide Image Placeholder 1"/>
+          <p:cNvSpPr>
+            <a:spLocks noGrp="1" noRot="1" noChangeAspect="1"/>
+          </p:cNvSpPr>
+          <p:nvPr>
+            <p:ph type="sldImg"/>
+          </p:nvPr>
+        </p:nvSpPr>
+        <p:spPr/>
+      </p:sp>
+      <p:sp>
+        <p:nvSpPr>
+          <p:cNvPr id="3" name="Notes Placeholder 2"/>
+          <p:cNvSpPr>
+            <a:spLocks noGrp="1"/>
+          </p:cNvSpPr>
+          <p:nvPr>
+            <p:ph type="body" idx="1"/>
+          </p:nvPr>
+        </p:nvSpPr>
+        <p:spPr/>
+        <p:txBody>
+          <a:bodyPr/>
+          <a:lstStyle/>
+          <a:p>
+            <a:endParaRPr lang="en-US" dirty="0"/>
+          </a:p>
+        </p:txBody>
+      </p:sp>
+    </p:spTree>
+    <p:extLst>
+      <p:ext uri="{BB962C8B-B14F-4D97-AF65-F5344CB8AC3E}">
         <p14:creationId xmlns:p14="http://schemas.microsoft.com/office/powerpoint/2010/main" val="2414867705"/>
+      </p:ext>
+    </p:extLst>
+  </p:cSld>
+  <p:clrMapOvr>
+    <a:masterClrMapping/>
+  </p:clrMapOvr>
+</p:notes>
+</file>
+
+<file path=ppt/notesSlides/notesSlide15.xml><?xml version="1.0" encoding="utf-8"?>
+<p:notes xmlns:a="http://schemas.openxmlformats.org/drawingml/2006/main" xmlns:r="http://schemas.openxmlformats.org/officeDocument/2006/relationships" xmlns:p="http://schemas.openxmlformats.org/presentationml/2006/main">
+  <p:cSld>
+    <p:spTree>
+      <p:nvGrpSpPr>
+        <p:cNvPr id="1" name=""/>
+        <p:cNvGrpSpPr/>
+        <p:nvPr/>
+      </p:nvGrpSpPr>
+      <p:grpSpPr>
+        <a:xfrm>
+          <a:off x="0" y="0"/>
+          <a:ext cx="0" cy="0"/>
+          <a:chOff x="0" y="0"/>
+          <a:chExt cx="0" cy="0"/>
+        </a:xfrm>
+      </p:grpSpPr>
+      <p:sp>
+        <p:nvSpPr>
+          <p:cNvPr id="2" name="Slide Image Placeholder 1"/>
+          <p:cNvSpPr>
+            <a:spLocks noGrp="1" noRot="1" noChangeAspect="1"/>
+          </p:cNvSpPr>
+          <p:nvPr>
+            <p:ph type="sldImg"/>
+          </p:nvPr>
+        </p:nvSpPr>
+        <p:spPr/>
+      </p:sp>
+      <p:sp>
+        <p:nvSpPr>
+          <p:cNvPr id="3" name="Notes Placeholder 2"/>
+          <p:cNvSpPr>
+            <a:spLocks noGrp="1"/>
+          </p:cNvSpPr>
+          <p:nvPr>
+            <p:ph type="body" idx="1"/>
+          </p:nvPr>
+        </p:nvSpPr>
+        <p:spPr/>
+        <p:txBody>
+          <a:bodyPr/>
+          <a:lstStyle/>
+          <a:p>
+            <a:endParaRPr lang="en-US" dirty="0"/>
+          </a:p>
+        </p:txBody>
+      </p:sp>
+    </p:spTree>
+    <p:extLst>
+      <p:ext uri="{BB962C8B-B14F-4D97-AF65-F5344CB8AC3E}">
+        <p14:creationId xmlns:p14="http://schemas.microsoft.com/office/powerpoint/2010/main" val="2108244670"/>
       </p:ext>
     </p:extLst>
   </p:cSld>
@@ -1417,7 +1541,7 @@
     </p:spTree>
     <p:extLst>
       <p:ext uri="{BB962C8B-B14F-4D97-AF65-F5344CB8AC3E}">
-        <p14:creationId xmlns:p14="http://schemas.microsoft.com/office/powerpoint/2010/main" val="2367184361"/>
+        <p14:creationId xmlns:p14="http://schemas.microsoft.com/office/powerpoint/2010/main" val="2193731060"/>
       </p:ext>
     </p:extLst>
   </p:cSld>
@@ -6236,11 +6360,7 @@
             </a:r>
             <a:r>
               <a:rPr lang="hu-HU" dirty="0" smtClean="0"/>
-              <a:t> – </a:t>
-            </a:r>
-            <a:r>
-              <a:rPr lang="hu-HU" dirty="0" smtClean="0"/>
-              <a:t>Egyedi esetek</a:t>
+              <a:t> – Egyedi esetek</a:t>
             </a:r>
             <a:endParaRPr lang="en-US" dirty="0"/>
           </a:p>
@@ -6424,6 +6544,106 @@
           <a:chExt cx="0" cy="0"/>
         </a:xfrm>
       </p:grpSpPr>
+      <p:pic>
+        <p:nvPicPr>
+          <p:cNvPr id="3" name="Kép 2"/>
+          <p:cNvPicPr>
+            <a:picLocks noChangeAspect="1"/>
+          </p:cNvPicPr>
+          <p:nvPr/>
+        </p:nvPicPr>
+        <p:blipFill>
+          <a:blip r:embed="rId3">
+            <a:extLst>
+              <a:ext uri="{28A0092B-C50C-407E-A947-70E740481C1C}">
+                <a14:useLocalDpi xmlns:a14="http://schemas.microsoft.com/office/drawing/2010/main" val="0"/>
+              </a:ext>
+            </a:extLst>
+          </a:blip>
+          <a:stretch>
+            <a:fillRect/>
+          </a:stretch>
+        </p:blipFill>
+        <p:spPr>
+          <a:xfrm>
+            <a:off x="0" y="1246949"/>
+            <a:ext cx="5191850" cy="4344006"/>
+          </a:xfrm>
+          <a:prstGeom prst="rect">
+            <a:avLst/>
+          </a:prstGeom>
+        </p:spPr>
+      </p:pic>
+      <p:pic>
+        <p:nvPicPr>
+          <p:cNvPr id="5" name="Kép 4"/>
+          <p:cNvPicPr>
+            <a:picLocks noChangeAspect="1"/>
+          </p:cNvPicPr>
+          <p:nvPr/>
+        </p:nvPicPr>
+        <p:blipFill>
+          <a:blip r:embed="rId4">
+            <a:extLst>
+              <a:ext uri="{28A0092B-C50C-407E-A947-70E740481C1C}">
+                <a14:useLocalDpi xmlns:a14="http://schemas.microsoft.com/office/drawing/2010/main" val="0"/>
+              </a:ext>
+            </a:extLst>
+          </a:blip>
+          <a:stretch>
+            <a:fillRect/>
+          </a:stretch>
+        </p:blipFill>
+        <p:spPr>
+          <a:xfrm>
+            <a:off x="5401153" y="4552285"/>
+            <a:ext cx="3691784" cy="1900183"/>
+          </a:xfrm>
+          <a:prstGeom prst="rect">
+            <a:avLst/>
+          </a:prstGeom>
+        </p:spPr>
+      </p:pic>
+      <p:pic>
+        <p:nvPicPr>
+          <p:cNvPr id="6" name="Kép 5"/>
+          <p:cNvPicPr>
+            <a:picLocks noChangeAspect="1"/>
+          </p:cNvPicPr>
+          <p:nvPr/>
+        </p:nvPicPr>
+        <p:blipFill>
+          <a:blip r:embed="rId5">
+            <a:clrChange>
+              <a:clrFrom>
+                <a:srgbClr val="FFFFFF"/>
+              </a:clrFrom>
+              <a:clrTo>
+                <a:srgbClr val="FFFFFF">
+                  <a:alpha val="0"/>
+                </a:srgbClr>
+              </a:clrTo>
+            </a:clrChange>
+            <a:extLst>
+              <a:ext uri="{28A0092B-C50C-407E-A947-70E740481C1C}">
+                <a14:useLocalDpi xmlns:a14="http://schemas.microsoft.com/office/drawing/2010/main" val="0"/>
+              </a:ext>
+            </a:extLst>
+          </a:blip>
+          <a:stretch>
+            <a:fillRect/>
+          </a:stretch>
+        </p:blipFill>
+        <p:spPr>
+          <a:xfrm>
+            <a:off x="2595925" y="720725"/>
+            <a:ext cx="6192350" cy="4343644"/>
+          </a:xfrm>
+          <a:prstGeom prst="rect">
+            <a:avLst/>
+          </a:prstGeom>
+        </p:spPr>
+      </p:pic>
       <p:sp>
         <p:nvSpPr>
           <p:cNvPr id="2" name="Cím 1"/>
@@ -6446,39 +6666,288 @@
           <a:p>
             <a:r>
               <a:rPr lang="hu-HU" dirty="0" smtClean="0"/>
-              <a:t>Példánymodell – TBD</a:t>
+              <a:t>Példánymodell – </a:t>
+            </a:r>
+            <a:r>
+              <a:rPr lang="hu-HU" dirty="0" smtClean="0"/>
+              <a:t>Struktúra</a:t>
             </a:r>
             <a:endParaRPr lang="en-US" dirty="0"/>
           </a:p>
         </p:txBody>
       </p:sp>
-      <p:sp>
-        <p:nvSpPr>
-          <p:cNvPr id="3" name="Tartalom helye 2"/>
+    </p:spTree>
+    <p:extLst>
+      <p:ext uri="{BB962C8B-B14F-4D97-AF65-F5344CB8AC3E}">
+        <p14:creationId xmlns:p14="http://schemas.microsoft.com/office/powerpoint/2010/main" val="1320124468"/>
+      </p:ext>
+    </p:extLst>
+  </p:cSld>
+  <p:clrMapOvr>
+    <a:masterClrMapping/>
+  </p:clrMapOvr>
+  <p:timing>
+    <p:tnLst>
+      <p:par>
+        <p:cTn id="1" dur="indefinite" restart="never" nodeType="tmRoot"/>
+      </p:par>
+    </p:tnLst>
+  </p:timing>
+</p:sld>
+</file>
+
+<file path=ppt/slides/slide14.xml><?xml version="1.0" encoding="utf-8"?>
+<p:sld xmlns:a="http://schemas.openxmlformats.org/drawingml/2006/main" xmlns:r="http://schemas.openxmlformats.org/officeDocument/2006/relationships" xmlns:p="http://schemas.openxmlformats.org/presentationml/2006/main">
+  <p:cSld>
+    <p:spTree>
+      <p:nvGrpSpPr>
+        <p:cNvPr id="1" name=""/>
+        <p:cNvGrpSpPr/>
+        <p:nvPr/>
+      </p:nvGrpSpPr>
+      <p:grpSpPr>
+        <a:xfrm>
+          <a:off x="0" y="0"/>
+          <a:ext cx="0" cy="0"/>
+          <a:chOff x="0" y="0"/>
+          <a:chExt cx="0" cy="0"/>
+        </a:xfrm>
+      </p:grpSpPr>
+      <p:sp>
+        <p:nvSpPr>
+          <p:cNvPr id="2" name="Cím 1"/>
           <p:cNvSpPr>
             <a:spLocks noGrp="1"/>
           </p:cNvSpPr>
+          <p:nvPr>
+            <p:ph type="title"/>
+          </p:nvPr>
+        </p:nvSpPr>
+        <p:spPr>
+          <a:xfrm>
+            <a:off x="0" y="0"/>
+            <a:ext cx="9144000" cy="720725"/>
+          </a:xfrm>
+        </p:spPr>
+        <p:txBody>
+          <a:bodyPr/>
+          <a:lstStyle/>
+          <a:p>
+            <a:r>
+              <a:rPr lang="hu-HU" dirty="0" smtClean="0"/>
+              <a:t>Példánymodell – </a:t>
+            </a:r>
+            <a:r>
+              <a:rPr lang="hu-HU" dirty="0" smtClean="0"/>
+              <a:t>Viselkedés </a:t>
+            </a:r>
+            <a:r>
+              <a:rPr lang="hu-HU" dirty="0"/>
+              <a:t>–</a:t>
+            </a:r>
+            <a:r>
+              <a:rPr lang="hu-HU" dirty="0" smtClean="0"/>
+              <a:t> </a:t>
+            </a:r>
+            <a:r>
+              <a:rPr lang="hu-HU" dirty="0" smtClean="0"/>
+              <a:t>Quad1</a:t>
+            </a:r>
+            <a:endParaRPr lang="en-US" dirty="0"/>
+          </a:p>
+        </p:txBody>
+      </p:sp>
+      <p:pic>
+        <p:nvPicPr>
+          <p:cNvPr id="5" name="Tartalom helye 4"/>
+          <p:cNvPicPr>
+            <a:picLocks noGrp="1" noChangeAspect="1"/>
+          </p:cNvPicPr>
           <p:nvPr>
             <p:ph idx="1"/>
           </p:nvPr>
-        </p:nvSpPr>
-        <p:spPr/>
-        <p:txBody>
-          <a:bodyPr/>
-          <a:lstStyle/>
-          <a:p>
-            <a:r>
-              <a:rPr lang="hu-HU" dirty="0" smtClean="0"/>
-              <a:t>TBD</a:t>
-            </a:r>
-            <a:endParaRPr lang="en-US" dirty="0"/>
-          </a:p>
-        </p:txBody>
-      </p:sp>
+        </p:nvPicPr>
+        <p:blipFill>
+          <a:blip r:embed="rId3">
+            <a:extLst>
+              <a:ext uri="{28A0092B-C50C-407E-A947-70E740481C1C}">
+                <a14:useLocalDpi xmlns:a14="http://schemas.microsoft.com/office/drawing/2010/main" val="0"/>
+              </a:ext>
+            </a:extLst>
+          </a:blip>
+          <a:stretch>
+            <a:fillRect/>
+          </a:stretch>
+        </p:blipFill>
+        <p:spPr>
+          <a:xfrm>
+            <a:off x="5643981" y="1677981"/>
+            <a:ext cx="3000794" cy="2838846"/>
+          </a:xfrm>
+        </p:spPr>
+      </p:pic>
+      <p:pic>
+        <p:nvPicPr>
+          <p:cNvPr id="4" name="Kép 3"/>
+          <p:cNvPicPr>
+            <a:picLocks noChangeAspect="1"/>
+          </p:cNvPicPr>
+          <p:nvPr/>
+        </p:nvPicPr>
+        <p:blipFill>
+          <a:blip r:embed="rId4">
+            <a:extLst>
+              <a:ext uri="{28A0092B-C50C-407E-A947-70E740481C1C}">
+                <a14:useLocalDpi xmlns:a14="http://schemas.microsoft.com/office/drawing/2010/main" val="0"/>
+              </a:ext>
+            </a:extLst>
+          </a:blip>
+          <a:stretch>
+            <a:fillRect/>
+          </a:stretch>
+        </p:blipFill>
+        <p:spPr>
+          <a:xfrm>
+            <a:off x="0" y="1454112"/>
+            <a:ext cx="5239481" cy="3286584"/>
+          </a:xfrm>
+          <a:prstGeom prst="rect">
+            <a:avLst/>
+          </a:prstGeom>
+        </p:spPr>
+      </p:pic>
     </p:spTree>
     <p:extLst>
       <p:ext uri="{BB962C8B-B14F-4D97-AF65-F5344CB8AC3E}">
         <p14:creationId xmlns:p14="http://schemas.microsoft.com/office/powerpoint/2010/main" val="238478817"/>
+      </p:ext>
+    </p:extLst>
+  </p:cSld>
+  <p:clrMapOvr>
+    <a:masterClrMapping/>
+  </p:clrMapOvr>
+  <p:timing>
+    <p:tnLst>
+      <p:par>
+        <p:cTn id="1" dur="indefinite" restart="never" nodeType="tmRoot"/>
+      </p:par>
+    </p:tnLst>
+  </p:timing>
+</p:sld>
+</file>
+
+<file path=ppt/slides/slide15.xml><?xml version="1.0" encoding="utf-8"?>
+<p:sld xmlns:a="http://schemas.openxmlformats.org/drawingml/2006/main" xmlns:r="http://schemas.openxmlformats.org/officeDocument/2006/relationships" xmlns:p="http://schemas.openxmlformats.org/presentationml/2006/main">
+  <p:cSld>
+    <p:spTree>
+      <p:nvGrpSpPr>
+        <p:cNvPr id="1" name=""/>
+        <p:cNvGrpSpPr/>
+        <p:nvPr/>
+      </p:nvGrpSpPr>
+      <p:grpSpPr>
+        <a:xfrm>
+          <a:off x="0" y="0"/>
+          <a:ext cx="0" cy="0"/>
+          <a:chOff x="0" y="0"/>
+          <a:chExt cx="0" cy="0"/>
+        </a:xfrm>
+      </p:grpSpPr>
+      <p:sp>
+        <p:nvSpPr>
+          <p:cNvPr id="2" name="Cím 1"/>
+          <p:cNvSpPr>
+            <a:spLocks noGrp="1"/>
+          </p:cNvSpPr>
+          <p:nvPr>
+            <p:ph type="title"/>
+          </p:nvPr>
+        </p:nvSpPr>
+        <p:spPr>
+          <a:xfrm>
+            <a:off x="0" y="0"/>
+            <a:ext cx="9144000" cy="720725"/>
+          </a:xfrm>
+        </p:spPr>
+        <p:txBody>
+          <a:bodyPr/>
+          <a:lstStyle/>
+          <a:p>
+            <a:r>
+              <a:rPr lang="hu-HU" dirty="0" smtClean="0"/>
+              <a:t>Példánymodell – </a:t>
+            </a:r>
+            <a:r>
+              <a:rPr lang="hu-HU" dirty="0" smtClean="0"/>
+              <a:t>Viselkedés – Quad2</a:t>
+            </a:r>
+            <a:endParaRPr lang="en-US" dirty="0"/>
+          </a:p>
+        </p:txBody>
+      </p:sp>
+      <p:pic>
+        <p:nvPicPr>
+          <p:cNvPr id="5" name="Tartalom helye 4"/>
+          <p:cNvPicPr>
+            <a:picLocks noGrp="1" noChangeAspect="1"/>
+          </p:cNvPicPr>
+          <p:nvPr>
+            <p:ph idx="1"/>
+          </p:nvPr>
+        </p:nvPicPr>
+        <p:blipFill>
+          <a:blip r:embed="rId3">
+            <a:extLst>
+              <a:ext uri="{28A0092B-C50C-407E-A947-70E740481C1C}">
+                <a14:useLocalDpi xmlns:a14="http://schemas.microsoft.com/office/drawing/2010/main" val="0"/>
+              </a:ext>
+            </a:extLst>
+          </a:blip>
+          <a:stretch>
+            <a:fillRect/>
+          </a:stretch>
+        </p:blipFill>
+        <p:spPr>
+          <a:xfrm>
+            <a:off x="0" y="2136491"/>
+            <a:ext cx="5239481" cy="2448267"/>
+          </a:xfrm>
+        </p:spPr>
+      </p:pic>
+      <p:pic>
+        <p:nvPicPr>
+          <p:cNvPr id="6" name="Kép 5"/>
+          <p:cNvPicPr>
+            <a:picLocks noChangeAspect="1"/>
+          </p:cNvPicPr>
+          <p:nvPr/>
+        </p:nvPicPr>
+        <p:blipFill>
+          <a:blip r:embed="rId4">
+            <a:extLst>
+              <a:ext uri="{28A0092B-C50C-407E-A947-70E740481C1C}">
+                <a14:useLocalDpi xmlns:a14="http://schemas.microsoft.com/office/drawing/2010/main" val="0"/>
+              </a:ext>
+            </a:extLst>
+          </a:blip>
+          <a:stretch>
+            <a:fillRect/>
+          </a:stretch>
+        </p:blipFill>
+        <p:spPr>
+          <a:xfrm>
+            <a:off x="5645155" y="2550886"/>
+            <a:ext cx="2676899" cy="1619476"/>
+          </a:xfrm>
+          <a:prstGeom prst="rect">
+            <a:avLst/>
+          </a:prstGeom>
+        </p:spPr>
+      </p:pic>
+    </p:spTree>
+    <p:extLst>
+      <p:ext uri="{BB962C8B-B14F-4D97-AF65-F5344CB8AC3E}">
+        <p14:creationId xmlns:p14="http://schemas.microsoft.com/office/powerpoint/2010/main" val="4039812300"/>
       </p:ext>
     </p:extLst>
   </p:cSld>
@@ -7275,18 +7744,46 @@
           <a:lstStyle/>
           <a:p>
             <a:r>
-              <a:rPr lang="hu-HU" dirty="0" smtClean="0"/>
-              <a:t>Viselkedési </a:t>
-            </a:r>
-            <a:r>
-              <a:rPr lang="hu-HU" dirty="0" err="1" smtClean="0"/>
+              <a:rPr lang="hu-HU" sz="2800" dirty="0" err="1" smtClean="0"/>
+              <a:t>Struktúrális</a:t>
+            </a:r>
+            <a:r>
+              <a:rPr lang="hu-HU" sz="2800" dirty="0" smtClean="0"/>
+              <a:t> </a:t>
+            </a:r>
+            <a:r>
+              <a:rPr lang="hu-HU" sz="2800" dirty="0" err="1" smtClean="0"/>
               <a:t>metamodell</a:t>
             </a:r>
             <a:r>
-              <a:rPr lang="hu-HU" dirty="0" smtClean="0"/>
-              <a:t> – TBD</a:t>
-            </a:r>
-            <a:endParaRPr lang="en-US" dirty="0"/>
+              <a:rPr lang="hu-HU" sz="2800" dirty="0" smtClean="0"/>
+              <a:t> </a:t>
+            </a:r>
+            <a:r>
+              <a:rPr lang="hu-HU" sz="2800" dirty="0" smtClean="0"/>
+              <a:t>– </a:t>
+            </a:r>
+            <a:r>
+              <a:rPr lang="hu-HU" sz="2800" dirty="0" err="1" smtClean="0"/>
+              <a:t>Derived</a:t>
+            </a:r>
+            <a:r>
+              <a:rPr lang="hu-HU" sz="2800" dirty="0" smtClean="0"/>
+              <a:t> </a:t>
+            </a:r>
+            <a:r>
+              <a:rPr lang="hu-HU" sz="2800" dirty="0" err="1" smtClean="0"/>
+              <a:t>Feature</a:t>
+            </a:r>
+            <a:r>
+              <a:rPr lang="hu-HU" sz="2800" dirty="0" smtClean="0"/>
+              <a:t> és </a:t>
+            </a:r>
+            <a:r>
+              <a:rPr lang="hu-HU" sz="2800" dirty="0" err="1" smtClean="0"/>
+              <a:t>Constraint</a:t>
+            </a:r>
+            <a:endParaRPr lang="en-US" sz="2800" dirty="0"/>
           </a:p>
         </p:txBody>
       </p:sp>
@@ -7305,18 +7802,38 @@
           <a:bodyPr/>
           <a:lstStyle/>
           <a:p>
-            <a:r>
-              <a:rPr lang="hu-HU" dirty="0" smtClean="0"/>
-              <a:t>TBD</a:t>
-            </a:r>
             <a:endParaRPr lang="en-US" dirty="0"/>
           </a:p>
         </p:txBody>
       </p:sp>
+      <p:pic>
+        <p:nvPicPr>
+          <p:cNvPr id="5" name="Kép 4"/>
+          <p:cNvPicPr>
+            <a:picLocks noChangeAspect="1"/>
+          </p:cNvPicPr>
+          <p:nvPr/>
+        </p:nvPicPr>
+        <p:blipFill>
+          <a:blip r:embed="rId3"/>
+          <a:stretch>
+            <a:fillRect/>
+          </a:stretch>
+        </p:blipFill>
+        <p:spPr>
+          <a:xfrm>
+            <a:off x="942975" y="1576387"/>
+            <a:ext cx="7258050" cy="3705225"/>
+          </a:xfrm>
+          <a:prstGeom prst="rect">
+            <a:avLst/>
+          </a:prstGeom>
+        </p:spPr>
+      </p:pic>
     </p:spTree>
     <p:extLst>
       <p:ext uri="{BB962C8B-B14F-4D97-AF65-F5344CB8AC3E}">
-        <p14:creationId xmlns:p14="http://schemas.microsoft.com/office/powerpoint/2010/main" val="1418461928"/>
+        <p14:creationId xmlns:p14="http://schemas.microsoft.com/office/powerpoint/2010/main" val="3479993205"/>
       </p:ext>
     </p:extLst>
   </p:cSld>
@@ -7380,11 +7897,7 @@
             </a:r>
             <a:r>
               <a:rPr lang="hu-HU" dirty="0" smtClean="0"/>
-              <a:t> – </a:t>
-            </a:r>
-            <a:r>
-              <a:rPr lang="hu-HU" dirty="0" smtClean="0"/>
-              <a:t>Top </a:t>
+              <a:t> – Top </a:t>
             </a:r>
             <a:r>
               <a:rPr lang="hu-HU" dirty="0" err="1" smtClean="0"/>

</xml_diff>